<commit_message>
PuTorch, tenforflow, and numpy
</commit_message>
<xml_diff>
--- a/27_ConfusionMatrix.pptx
+++ b/27_ConfusionMatrix.pptx
@@ -21971,12 +21971,12 @@
           <a:p>
             <a:pPr algn="l"/>
             <a:r>
-              <a:rPr lang="en-US" altLang="zh-TW" sz="3600" b="1" dirty="0">
+              <a:rPr lang="en-US" altLang="zh-TW" sz="3600" b="1">
                 <a:solidFill>
                   <a:srgbClr val="FFFF00"/>
                 </a:solidFill>
               </a:rPr>
-              <a:t>27.2 Predict with Gradient Computation</a:t>
+              <a:t>27.1 Predict with Gradient Computation</a:t>
             </a:r>
             <a:endParaRPr lang="zh-TW" altLang="en-US" sz="3600" b="1" dirty="0">
               <a:solidFill>

</xml_diff>